<commit_message>
[ADD] - PRESENTATIE ANIMATIE OP LAATSTE DIA'S
</commit_message>
<xml_diff>
--- a/Documenten/Project Managment/BCLW_Presentatie_HOLOCAR.pptx
+++ b/Documenten/Project Managment/BCLW_Presentatie_HOLOCAR.pptx
@@ -5,7 +5,7 @@
     <p:sldMasterId id="2147483661" r:id="rId1"/>
   </p:sldMasterIdLst>
   <p:notesMasterIdLst>
-    <p:notesMasterId r:id="rId19"/>
+    <p:notesMasterId r:id="rId20"/>
   </p:notesMasterIdLst>
   <p:sldIdLst>
     <p:sldId id="256" r:id="rId2"/>
@@ -25,28 +25,29 @@
     <p:sldId id="292" r:id="rId16"/>
     <p:sldId id="294" r:id="rId17"/>
     <p:sldId id="297" r:id="rId18"/>
+    <p:sldId id="298" r:id="rId19"/>
   </p:sldIdLst>
   <p:sldSz cx="9144000" cy="5143500" type="screen16x9"/>
   <p:notesSz cx="6858000" cy="9144000"/>
   <p:embeddedFontLst>
     <p:embeddedFont>
       <p:font typeface="Titillium Web" panose="00000500000000000000" pitchFamily="2" charset="0"/>
-      <p:regular r:id="rId20"/>
-      <p:bold r:id="rId21"/>
-      <p:italic r:id="rId22"/>
-      <p:boldItalic r:id="rId23"/>
+      <p:regular r:id="rId21"/>
+      <p:bold r:id="rId22"/>
+      <p:italic r:id="rId23"/>
+      <p:boldItalic r:id="rId24"/>
     </p:embeddedFont>
     <p:embeddedFont>
       <p:font typeface="Titillium Web ExtraLight" panose="00000300000000000000" pitchFamily="2" charset="0"/>
-      <p:regular r:id="rId24"/>
-      <p:bold r:id="rId25"/>
-      <p:italic r:id="rId26"/>
-      <p:boldItalic r:id="rId27"/>
+      <p:regular r:id="rId25"/>
+      <p:bold r:id="rId26"/>
+      <p:italic r:id="rId27"/>
+      <p:boldItalic r:id="rId28"/>
     </p:embeddedFont>
     <p:embeddedFont>
       <p:font typeface="Titillium Web SemiBold" panose="00000700000000000000" pitchFamily="2" charset="0"/>
-      <p:bold r:id="rId28"/>
-      <p:boldItalic r:id="rId29"/>
+      <p:bold r:id="rId29"/>
+      <p:boldItalic r:id="rId30"/>
     </p:embeddedFont>
   </p:embeddedFontLst>
   <p:defaultTextStyle>
@@ -289,7 +290,7 @@
 <file path=ppt/revisionInfo.xml><?xml version="1.0" encoding="utf-8"?>
 <p1510:revInfo xmlns:a="http://schemas.openxmlformats.org/drawingml/2006/main" xmlns:r="http://schemas.openxmlformats.org/officeDocument/2006/relationships" xmlns:p1510="http://schemas.microsoft.com/office/powerpoint/2015/10/main">
   <p1510:revLst>
-    <p1510:client id="{FC0F7049-3325-426A-9CCE-D227D355AE12}" v="12" dt="2018-09-20T12:36:37.283"/>
+    <p1510:client id="{205A2D33-D804-44FB-A889-C809251970DC}" v="30" dt="2018-11-07T11:02:25.959"/>
   </p1510:revLst>
 </p1510:revInfo>
 </file>
@@ -333,6 +334,540 @@
           </ac:spMkLst>
         </pc:spChg>
       </pc:sldChg>
+    </pc:docChg>
+  </pc:docChgLst>
+  <pc:docChgLst>
+    <pc:chgData name="Bart van Mandje" userId="b6ba49fbd88bd4d1" providerId="LiveId" clId="{205A2D33-D804-44FB-A889-C809251970DC}"/>
+    <pc:docChg chg="undo custSel addSld modSld modMainMaster">
+      <pc:chgData name="Bart van Mandje" userId="b6ba49fbd88bd4d1" providerId="LiveId" clId="{205A2D33-D804-44FB-A889-C809251970DC}" dt="2018-11-07T11:05:07.340" v="110" actId="478"/>
+      <pc:docMkLst>
+        <pc:docMk/>
+      </pc:docMkLst>
+      <pc:sldChg chg="modTransition">
+        <pc:chgData name="Bart van Mandje" userId="b6ba49fbd88bd4d1" providerId="LiveId" clId="{205A2D33-D804-44FB-A889-C809251970DC}" dt="2018-11-07T11:00:47.319" v="81"/>
+        <pc:sldMkLst>
+          <pc:docMk/>
+          <pc:sldMk cId="0" sldId="256"/>
+        </pc:sldMkLst>
+      </pc:sldChg>
+      <pc:sldChg chg="modTransition">
+        <pc:chgData name="Bart van Mandje" userId="b6ba49fbd88bd4d1" providerId="LiveId" clId="{205A2D33-D804-44FB-A889-C809251970DC}" dt="2018-11-07T11:00:47.319" v="81"/>
+        <pc:sldMkLst>
+          <pc:docMk/>
+          <pc:sldMk cId="0" sldId="260"/>
+        </pc:sldMkLst>
+      </pc:sldChg>
+      <pc:sldChg chg="modTransition">
+        <pc:chgData name="Bart van Mandje" userId="b6ba49fbd88bd4d1" providerId="LiveId" clId="{205A2D33-D804-44FB-A889-C809251970DC}" dt="2018-11-07T11:00:47.319" v="81"/>
+        <pc:sldMkLst>
+          <pc:docMk/>
+          <pc:sldMk cId="0" sldId="261"/>
+        </pc:sldMkLst>
+      </pc:sldChg>
+      <pc:sldChg chg="modTransition">
+        <pc:chgData name="Bart van Mandje" userId="b6ba49fbd88bd4d1" providerId="LiveId" clId="{205A2D33-D804-44FB-A889-C809251970DC}" dt="2018-11-07T11:00:47.319" v="81"/>
+        <pc:sldMkLst>
+          <pc:docMk/>
+          <pc:sldMk cId="0" sldId="272"/>
+        </pc:sldMkLst>
+      </pc:sldChg>
+      <pc:sldChg chg="modSp modTransition">
+        <pc:chgData name="Bart van Mandje" userId="b6ba49fbd88bd4d1" providerId="LiveId" clId="{205A2D33-D804-44FB-A889-C809251970DC}" dt="2018-11-07T11:00:47.319" v="81"/>
+        <pc:sldMkLst>
+          <pc:docMk/>
+          <pc:sldMk cId="179684113" sldId="283"/>
+        </pc:sldMkLst>
+        <pc:spChg chg="mod">
+          <ac:chgData name="Bart van Mandje" userId="b6ba49fbd88bd4d1" providerId="LiveId" clId="{205A2D33-D804-44FB-A889-C809251970DC}" dt="2018-11-07T10:54:38.633" v="53" actId="5793"/>
+          <ac:spMkLst>
+            <pc:docMk/>
+            <pc:sldMk cId="179684113" sldId="283"/>
+            <ac:spMk id="794" creationId="{00000000-0000-0000-0000-000000000000}"/>
+          </ac:spMkLst>
+        </pc:spChg>
+      </pc:sldChg>
+      <pc:sldChg chg="modTransition">
+        <pc:chgData name="Bart van Mandje" userId="b6ba49fbd88bd4d1" providerId="LiveId" clId="{205A2D33-D804-44FB-A889-C809251970DC}" dt="2018-11-07T11:00:47.319" v="81"/>
+        <pc:sldMkLst>
+          <pc:docMk/>
+          <pc:sldMk cId="3415063639" sldId="284"/>
+        </pc:sldMkLst>
+      </pc:sldChg>
+      <pc:sldChg chg="modTransition">
+        <pc:chgData name="Bart van Mandje" userId="b6ba49fbd88bd4d1" providerId="LiveId" clId="{205A2D33-D804-44FB-A889-C809251970DC}" dt="2018-11-07T11:00:47.319" v="81"/>
+        <pc:sldMkLst>
+          <pc:docMk/>
+          <pc:sldMk cId="1113192511" sldId="285"/>
+        </pc:sldMkLst>
+      </pc:sldChg>
+      <pc:sldChg chg="modTransition">
+        <pc:chgData name="Bart van Mandje" userId="b6ba49fbd88bd4d1" providerId="LiveId" clId="{205A2D33-D804-44FB-A889-C809251970DC}" dt="2018-11-07T11:00:47.319" v="81"/>
+        <pc:sldMkLst>
+          <pc:docMk/>
+          <pc:sldMk cId="3558199675" sldId="286"/>
+        </pc:sldMkLst>
+      </pc:sldChg>
+      <pc:sldChg chg="modSp modTransition">
+        <pc:chgData name="Bart van Mandje" userId="b6ba49fbd88bd4d1" providerId="LiveId" clId="{205A2D33-D804-44FB-A889-C809251970DC}" dt="2018-11-07T11:00:47.319" v="81"/>
+        <pc:sldMkLst>
+          <pc:docMk/>
+          <pc:sldMk cId="2967420700" sldId="287"/>
+        </pc:sldMkLst>
+        <pc:spChg chg="mod">
+          <ac:chgData name="Bart van Mandje" userId="b6ba49fbd88bd4d1" providerId="LiveId" clId="{205A2D33-D804-44FB-A889-C809251970DC}" dt="2018-11-07T10:55:40.661" v="55" actId="20577"/>
+          <ac:spMkLst>
+            <pc:docMk/>
+            <pc:sldMk cId="2967420700" sldId="287"/>
+            <ac:spMk id="927" creationId="{00000000-0000-0000-0000-000000000000}"/>
+          </ac:spMkLst>
+        </pc:spChg>
+      </pc:sldChg>
+      <pc:sldChg chg="modTransition">
+        <pc:chgData name="Bart van Mandje" userId="b6ba49fbd88bd4d1" providerId="LiveId" clId="{205A2D33-D804-44FB-A889-C809251970DC}" dt="2018-11-07T11:00:47.319" v="81"/>
+        <pc:sldMkLst>
+          <pc:docMk/>
+          <pc:sldMk cId="587357875" sldId="288"/>
+        </pc:sldMkLst>
+      </pc:sldChg>
+      <pc:sldChg chg="modTransition">
+        <pc:chgData name="Bart van Mandje" userId="b6ba49fbd88bd4d1" providerId="LiveId" clId="{205A2D33-D804-44FB-A889-C809251970DC}" dt="2018-11-07T11:00:47.319" v="81"/>
+        <pc:sldMkLst>
+          <pc:docMk/>
+          <pc:sldMk cId="1399688963" sldId="289"/>
+        </pc:sldMkLst>
+      </pc:sldChg>
+      <pc:sldChg chg="modTransition">
+        <pc:chgData name="Bart van Mandje" userId="b6ba49fbd88bd4d1" providerId="LiveId" clId="{205A2D33-D804-44FB-A889-C809251970DC}" dt="2018-11-07T11:00:47.319" v="81"/>
+        <pc:sldMkLst>
+          <pc:docMk/>
+          <pc:sldMk cId="2195701021" sldId="290"/>
+        </pc:sldMkLst>
+      </pc:sldChg>
+      <pc:sldChg chg="modTransition">
+        <pc:chgData name="Bart van Mandje" userId="b6ba49fbd88bd4d1" providerId="LiveId" clId="{205A2D33-D804-44FB-A889-C809251970DC}" dt="2018-11-07T11:00:47.319" v="81"/>
+        <pc:sldMkLst>
+          <pc:docMk/>
+          <pc:sldMk cId="672869977" sldId="291"/>
+        </pc:sldMkLst>
+      </pc:sldChg>
+      <pc:sldChg chg="modTransition">
+        <pc:chgData name="Bart van Mandje" userId="b6ba49fbd88bd4d1" providerId="LiveId" clId="{205A2D33-D804-44FB-A889-C809251970DC}" dt="2018-11-07T11:00:47.319" v="81"/>
+        <pc:sldMkLst>
+          <pc:docMk/>
+          <pc:sldMk cId="472621452" sldId="292"/>
+        </pc:sldMkLst>
+      </pc:sldChg>
+      <pc:sldChg chg="modTransition">
+        <pc:chgData name="Bart van Mandje" userId="b6ba49fbd88bd4d1" providerId="LiveId" clId="{205A2D33-D804-44FB-A889-C809251970DC}" dt="2018-11-07T11:00:47.319" v="81"/>
+        <pc:sldMkLst>
+          <pc:docMk/>
+          <pc:sldMk cId="3437236039" sldId="294"/>
+        </pc:sldMkLst>
+      </pc:sldChg>
+      <pc:sldChg chg="modTransition">
+        <pc:chgData name="Bart van Mandje" userId="b6ba49fbd88bd4d1" providerId="LiveId" clId="{205A2D33-D804-44FB-A889-C809251970DC}" dt="2018-11-07T11:00:47.319" v="81"/>
+        <pc:sldMkLst>
+          <pc:docMk/>
+          <pc:sldMk cId="1966069369" sldId="295"/>
+        </pc:sldMkLst>
+      </pc:sldChg>
+      <pc:sldChg chg="modTransition">
+        <pc:chgData name="Bart van Mandje" userId="b6ba49fbd88bd4d1" providerId="LiveId" clId="{205A2D33-D804-44FB-A889-C809251970DC}" dt="2018-11-07T11:00:47.319" v="81"/>
+        <pc:sldMkLst>
+          <pc:docMk/>
+          <pc:sldMk cId="3072225872" sldId="297"/>
+        </pc:sldMkLst>
+      </pc:sldChg>
+      <pc:sldChg chg="addSp delSp modSp add">
+        <pc:chgData name="Bart van Mandje" userId="b6ba49fbd88bd4d1" providerId="LiveId" clId="{205A2D33-D804-44FB-A889-C809251970DC}" dt="2018-11-07T11:05:07.340" v="110" actId="478"/>
+        <pc:sldMkLst>
+          <pc:docMk/>
+          <pc:sldMk cId="304383295" sldId="298"/>
+        </pc:sldMkLst>
+        <pc:spChg chg="add del mod">
+          <ac:chgData name="Bart van Mandje" userId="b6ba49fbd88bd4d1" providerId="LiveId" clId="{205A2D33-D804-44FB-A889-C809251970DC}" dt="2018-11-07T11:05:07.340" v="110" actId="478"/>
+          <ac:spMkLst>
+            <pc:docMk/>
+            <pc:sldMk cId="304383295" sldId="298"/>
+            <ac:spMk id="3" creationId="{0F0FD84C-AF33-4B47-82C1-64C9EBA9973D}"/>
+          </ac:spMkLst>
+        </pc:spChg>
+        <pc:spChg chg="del">
+          <ac:chgData name="Bart van Mandje" userId="b6ba49fbd88bd4d1" providerId="LiveId" clId="{205A2D33-D804-44FB-A889-C809251970DC}" dt="2018-11-07T11:01:51.960" v="83" actId="478"/>
+          <ac:spMkLst>
+            <pc:docMk/>
+            <pc:sldMk cId="304383295" sldId="298"/>
+            <ac:spMk id="22" creationId="{913D8975-563E-4114-8066-D49BC0BEDCCB}"/>
+          </ac:spMkLst>
+        </pc:spChg>
+        <pc:spChg chg="del">
+          <ac:chgData name="Bart van Mandje" userId="b6ba49fbd88bd4d1" providerId="LiveId" clId="{205A2D33-D804-44FB-A889-C809251970DC}" dt="2018-11-07T11:01:51.960" v="83" actId="478"/>
+          <ac:spMkLst>
+            <pc:docMk/>
+            <pc:sldMk cId="304383295" sldId="298"/>
+            <ac:spMk id="32" creationId="{DAFEDAF2-7168-41EC-86F6-6C3D208D5966}"/>
+          </ac:spMkLst>
+        </pc:spChg>
+        <pc:spChg chg="del">
+          <ac:chgData name="Bart van Mandje" userId="b6ba49fbd88bd4d1" providerId="LiveId" clId="{205A2D33-D804-44FB-A889-C809251970DC}" dt="2018-11-07T11:01:51.960" v="83" actId="478"/>
+          <ac:spMkLst>
+            <pc:docMk/>
+            <pc:sldMk cId="304383295" sldId="298"/>
+            <ac:spMk id="33" creationId="{11CD5ADA-2F9B-4533-AC7D-4E686E928B21}"/>
+          </ac:spMkLst>
+        </pc:spChg>
+        <pc:spChg chg="del">
+          <ac:chgData name="Bart van Mandje" userId="b6ba49fbd88bd4d1" providerId="LiveId" clId="{205A2D33-D804-44FB-A889-C809251970DC}" dt="2018-11-07T11:01:51.960" v="83" actId="478"/>
+          <ac:spMkLst>
+            <pc:docMk/>
+            <pc:sldMk cId="304383295" sldId="298"/>
+            <ac:spMk id="821" creationId="{00000000-0000-0000-0000-000000000000}"/>
+          </ac:spMkLst>
+        </pc:spChg>
+        <pc:spChg chg="del">
+          <ac:chgData name="Bart van Mandje" userId="b6ba49fbd88bd4d1" providerId="LiveId" clId="{205A2D33-D804-44FB-A889-C809251970DC}" dt="2018-11-07T11:01:51.960" v="83" actId="478"/>
+          <ac:spMkLst>
+            <pc:docMk/>
+            <pc:sldMk cId="304383295" sldId="298"/>
+            <ac:spMk id="822" creationId="{00000000-0000-0000-0000-000000000000}"/>
+          </ac:spMkLst>
+        </pc:spChg>
+        <pc:spChg chg="del">
+          <ac:chgData name="Bart van Mandje" userId="b6ba49fbd88bd4d1" providerId="LiveId" clId="{205A2D33-D804-44FB-A889-C809251970DC}" dt="2018-11-07T11:01:51.960" v="83" actId="478"/>
+          <ac:spMkLst>
+            <pc:docMk/>
+            <pc:sldMk cId="304383295" sldId="298"/>
+            <ac:spMk id="831" creationId="{00000000-0000-0000-0000-000000000000}"/>
+          </ac:spMkLst>
+        </pc:spChg>
+        <pc:spChg chg="del">
+          <ac:chgData name="Bart van Mandje" userId="b6ba49fbd88bd4d1" providerId="LiveId" clId="{205A2D33-D804-44FB-A889-C809251970DC}" dt="2018-11-07T11:01:51.960" v="83" actId="478"/>
+          <ac:spMkLst>
+            <pc:docMk/>
+            <pc:sldMk cId="304383295" sldId="298"/>
+            <ac:spMk id="833" creationId="{00000000-0000-0000-0000-000000000000}"/>
+          </ac:spMkLst>
+        </pc:spChg>
+        <pc:spChg chg="del">
+          <ac:chgData name="Bart van Mandje" userId="b6ba49fbd88bd4d1" providerId="LiveId" clId="{205A2D33-D804-44FB-A889-C809251970DC}" dt="2018-11-07T11:01:51.960" v="83" actId="478"/>
+          <ac:spMkLst>
+            <pc:docMk/>
+            <pc:sldMk cId="304383295" sldId="298"/>
+            <ac:spMk id="834" creationId="{00000000-0000-0000-0000-000000000000}"/>
+          </ac:spMkLst>
+        </pc:spChg>
+        <pc:picChg chg="del">
+          <ac:chgData name="Bart van Mandje" userId="b6ba49fbd88bd4d1" providerId="LiveId" clId="{205A2D33-D804-44FB-A889-C809251970DC}" dt="2018-11-07T11:01:51.960" v="83" actId="478"/>
+          <ac:picMkLst>
+            <pc:docMk/>
+            <pc:sldMk cId="304383295" sldId="298"/>
+            <ac:picMk id="2" creationId="{8F744952-3C95-4778-82DA-C9BD550335FE}"/>
+          </ac:picMkLst>
+        </pc:picChg>
+      </pc:sldChg>
+      <pc:sldMasterChg chg="modTransition modSldLayout">
+        <pc:chgData name="Bart van Mandje" userId="b6ba49fbd88bd4d1" providerId="LiveId" clId="{205A2D33-D804-44FB-A889-C809251970DC}" dt="2018-11-07T11:00:47.319" v="81"/>
+        <pc:sldMasterMkLst>
+          <pc:docMk/>
+          <pc:sldMasterMk cId="0" sldId="2147483661"/>
+        </pc:sldMasterMkLst>
+        <pc:sldLayoutChg chg="modTransition">
+          <pc:chgData name="Bart van Mandje" userId="b6ba49fbd88bd4d1" providerId="LiveId" clId="{205A2D33-D804-44FB-A889-C809251970DC}" dt="2018-11-07T11:00:47.319" v="81"/>
+          <pc:sldLayoutMkLst>
+            <pc:docMk/>
+            <pc:sldMasterMk cId="0" sldId="2147483661"/>
+            <pc:sldLayoutMk cId="0" sldId="2147483648"/>
+          </pc:sldLayoutMkLst>
+        </pc:sldLayoutChg>
+        <pc:sldLayoutChg chg="modTransition">
+          <pc:chgData name="Bart van Mandje" userId="b6ba49fbd88bd4d1" providerId="LiveId" clId="{205A2D33-D804-44FB-A889-C809251970DC}" dt="2018-11-07T11:00:47.319" v="81"/>
+          <pc:sldLayoutMkLst>
+            <pc:docMk/>
+            <pc:sldMasterMk cId="0" sldId="2147483661"/>
+            <pc:sldLayoutMk cId="0" sldId="2147483649"/>
+          </pc:sldLayoutMkLst>
+        </pc:sldLayoutChg>
+        <pc:sldLayoutChg chg="modTransition">
+          <pc:chgData name="Bart van Mandje" userId="b6ba49fbd88bd4d1" providerId="LiveId" clId="{205A2D33-D804-44FB-A889-C809251970DC}" dt="2018-11-07T11:00:47.319" v="81"/>
+          <pc:sldLayoutMkLst>
+            <pc:docMk/>
+            <pc:sldMasterMk cId="0" sldId="2147483661"/>
+            <pc:sldLayoutMk cId="0" sldId="2147483650"/>
+          </pc:sldLayoutMkLst>
+        </pc:sldLayoutChg>
+        <pc:sldLayoutChg chg="modTransition">
+          <pc:chgData name="Bart van Mandje" userId="b6ba49fbd88bd4d1" providerId="LiveId" clId="{205A2D33-D804-44FB-A889-C809251970DC}" dt="2018-11-07T11:00:47.319" v="81"/>
+          <pc:sldLayoutMkLst>
+            <pc:docMk/>
+            <pc:sldMasterMk cId="0" sldId="2147483661"/>
+            <pc:sldLayoutMk cId="0" sldId="2147483651"/>
+          </pc:sldLayoutMkLst>
+        </pc:sldLayoutChg>
+        <pc:sldLayoutChg chg="modTransition">
+          <pc:chgData name="Bart van Mandje" userId="b6ba49fbd88bd4d1" providerId="LiveId" clId="{205A2D33-D804-44FB-A889-C809251970DC}" dt="2018-11-07T11:00:47.319" v="81"/>
+          <pc:sldLayoutMkLst>
+            <pc:docMk/>
+            <pc:sldMasterMk cId="0" sldId="2147483661"/>
+            <pc:sldLayoutMk cId="0" sldId="2147483652"/>
+          </pc:sldLayoutMkLst>
+        </pc:sldLayoutChg>
+        <pc:sldLayoutChg chg="modTransition">
+          <pc:chgData name="Bart van Mandje" userId="b6ba49fbd88bd4d1" providerId="LiveId" clId="{205A2D33-D804-44FB-A889-C809251970DC}" dt="2018-11-07T11:00:47.319" v="81"/>
+          <pc:sldLayoutMkLst>
+            <pc:docMk/>
+            <pc:sldMasterMk cId="0" sldId="2147483661"/>
+            <pc:sldLayoutMk cId="0" sldId="2147483656"/>
+          </pc:sldLayoutMkLst>
+        </pc:sldLayoutChg>
+        <pc:sldLayoutChg chg="modTransition">
+          <pc:chgData name="Bart van Mandje" userId="b6ba49fbd88bd4d1" providerId="LiveId" clId="{205A2D33-D804-44FB-A889-C809251970DC}" dt="2018-11-07T11:00:47.319" v="81"/>
+          <pc:sldLayoutMkLst>
+            <pc:docMk/>
+            <pc:sldMasterMk cId="0" sldId="2147483661"/>
+            <pc:sldLayoutMk cId="0" sldId="2147483658"/>
+          </pc:sldLayoutMkLst>
+        </pc:sldLayoutChg>
+        <pc:sldLayoutChg chg="modTransition">
+          <pc:chgData name="Bart van Mandje" userId="b6ba49fbd88bd4d1" providerId="LiveId" clId="{205A2D33-D804-44FB-A889-C809251970DC}" dt="2018-11-07T11:00:47.319" v="81"/>
+          <pc:sldLayoutMkLst>
+            <pc:docMk/>
+            <pc:sldMasterMk cId="0" sldId="2147483661"/>
+            <pc:sldLayoutMk cId="0" sldId="2147483659"/>
+          </pc:sldLayoutMkLst>
+        </pc:sldLayoutChg>
+        <pc:sldLayoutChg chg="modTransition">
+          <pc:chgData name="Bart van Mandje" userId="b6ba49fbd88bd4d1" providerId="LiveId" clId="{205A2D33-D804-44FB-A889-C809251970DC}" dt="2018-11-07T11:00:47.319" v="81"/>
+          <pc:sldLayoutMkLst>
+            <pc:docMk/>
+            <pc:sldMasterMk cId="0" sldId="2147483661"/>
+            <pc:sldLayoutMk cId="0" sldId="2147483660"/>
+          </pc:sldLayoutMkLst>
+        </pc:sldLayoutChg>
+      </pc:sldMasterChg>
+      <pc:sldMasterChg chg="modTransition modSldLayout">
+        <pc:chgData name="Bart van Mandje" userId="b6ba49fbd88bd4d1" providerId="LiveId" clId="{205A2D33-D804-44FB-A889-C809251970DC}" dt="2018-11-07T11:00:42.380" v="79"/>
+        <pc:sldMasterMkLst>
+          <pc:docMk/>
+          <pc:sldMasterMk cId="59772768" sldId="2147483662"/>
+        </pc:sldMasterMkLst>
+        <pc:sldLayoutChg chg="addSp delSp">
+          <pc:chgData name="Bart van Mandje" userId="b6ba49fbd88bd4d1" providerId="LiveId" clId="{205A2D33-D804-44FB-A889-C809251970DC}" dt="2018-11-07T11:00:42.380" v="79"/>
+          <pc:sldLayoutMkLst>
+            <pc:docMk/>
+            <pc:sldMasterMk cId="59772768" sldId="2147483662"/>
+            <pc:sldLayoutMk cId="967436645" sldId="2147483674"/>
+          </pc:sldLayoutMkLst>
+          <pc:spChg chg="add del">
+            <ac:chgData name="Bart van Mandje" userId="b6ba49fbd88bd4d1" providerId="LiveId" clId="{205A2D33-D804-44FB-A889-C809251970DC}" dt="2018-11-07T11:00:42.380" v="79"/>
+            <ac:spMkLst>
+              <pc:docMk/>
+              <pc:sldMasterMk cId="59772768" sldId="2147483662"/>
+              <pc:sldLayoutMk cId="967436645" sldId="2147483674"/>
+              <ac:spMk id="113" creationId="{00000000-0000-0000-0000-000000000000}"/>
+            </ac:spMkLst>
+          </pc:spChg>
+          <pc:grpChg chg="add del">
+            <ac:chgData name="Bart van Mandje" userId="b6ba49fbd88bd4d1" providerId="LiveId" clId="{205A2D33-D804-44FB-A889-C809251970DC}" dt="2018-11-07T11:00:42.380" v="79"/>
+            <ac:grpSpMkLst>
+              <pc:docMk/>
+              <pc:sldMasterMk cId="59772768" sldId="2147483662"/>
+              <pc:sldLayoutMk cId="967436645" sldId="2147483674"/>
+              <ac:grpSpMk id="12" creationId="{00000000-0000-0000-0000-000000000000}"/>
+            </ac:grpSpMkLst>
+          </pc:grpChg>
+          <pc:grpChg chg="add del">
+            <ac:chgData name="Bart van Mandje" userId="b6ba49fbd88bd4d1" providerId="LiveId" clId="{205A2D33-D804-44FB-A889-C809251970DC}" dt="2018-11-07T11:00:42.380" v="79"/>
+            <ac:grpSpMkLst>
+              <pc:docMk/>
+              <pc:sldMasterMk cId="59772768" sldId="2147483662"/>
+              <pc:sldLayoutMk cId="967436645" sldId="2147483674"/>
+              <ac:grpSpMk id="46" creationId="{00000000-0000-0000-0000-000000000000}"/>
+            </ac:grpSpMkLst>
+          </pc:grpChg>
+        </pc:sldLayoutChg>
+        <pc:sldLayoutChg chg="addSp delSp">
+          <pc:chgData name="Bart van Mandje" userId="b6ba49fbd88bd4d1" providerId="LiveId" clId="{205A2D33-D804-44FB-A889-C809251970DC}" dt="2018-11-07T11:00:42.380" v="79"/>
+          <pc:sldLayoutMkLst>
+            <pc:docMk/>
+            <pc:sldMasterMk cId="59772768" sldId="2147483662"/>
+            <pc:sldLayoutMk cId="444653200" sldId="2147483675"/>
+          </pc:sldLayoutMkLst>
+          <pc:spChg chg="add del">
+            <ac:chgData name="Bart van Mandje" userId="b6ba49fbd88bd4d1" providerId="LiveId" clId="{205A2D33-D804-44FB-A889-C809251970DC}" dt="2018-11-07T11:00:42.380" v="79"/>
+            <ac:spMkLst>
+              <pc:docMk/>
+              <pc:sldMasterMk cId="59772768" sldId="2147483662"/>
+              <pc:sldLayoutMk cId="444653200" sldId="2147483675"/>
+              <ac:spMk id="331" creationId="{00000000-0000-0000-0000-000000000000}"/>
+            </ac:spMkLst>
+          </pc:spChg>
+        </pc:sldLayoutChg>
+        <pc:sldLayoutChg chg="addSp delSp">
+          <pc:chgData name="Bart van Mandje" userId="b6ba49fbd88bd4d1" providerId="LiveId" clId="{205A2D33-D804-44FB-A889-C809251970DC}" dt="2018-11-07T11:00:42.380" v="79"/>
+          <pc:sldLayoutMkLst>
+            <pc:docMk/>
+            <pc:sldMasterMk cId="59772768" sldId="2147483662"/>
+            <pc:sldLayoutMk cId="3491988796" sldId="2147483676"/>
+          </pc:sldLayoutMkLst>
+          <pc:grpChg chg="add del">
+            <ac:chgData name="Bart van Mandje" userId="b6ba49fbd88bd4d1" providerId="LiveId" clId="{205A2D33-D804-44FB-A889-C809251970DC}" dt="2018-11-07T11:00:42.380" v="79"/>
+            <ac:grpSpMkLst>
+              <pc:docMk/>
+              <pc:sldMasterMk cId="59772768" sldId="2147483662"/>
+              <pc:sldLayoutMk cId="3491988796" sldId="2147483676"/>
+              <ac:grpSpMk id="117" creationId="{00000000-0000-0000-0000-000000000000}"/>
+            </ac:grpSpMkLst>
+          </pc:grpChg>
+          <pc:grpChg chg="add del">
+            <ac:chgData name="Bart van Mandje" userId="b6ba49fbd88bd4d1" providerId="LiveId" clId="{205A2D33-D804-44FB-A889-C809251970DC}" dt="2018-11-07T11:00:42.380" v="79"/>
+            <ac:grpSpMkLst>
+              <pc:docMk/>
+              <pc:sldMasterMk cId="59772768" sldId="2147483662"/>
+              <pc:sldLayoutMk cId="3491988796" sldId="2147483676"/>
+              <ac:grpSpMk id="151" creationId="{00000000-0000-0000-0000-000000000000}"/>
+            </ac:grpSpMkLst>
+          </pc:grpChg>
+        </pc:sldLayoutChg>
+        <pc:sldLayoutChg chg="addSp delSp">
+          <pc:chgData name="Bart van Mandje" userId="b6ba49fbd88bd4d1" providerId="LiveId" clId="{205A2D33-D804-44FB-A889-C809251970DC}" dt="2018-11-07T11:00:42.380" v="79"/>
+          <pc:sldLayoutMkLst>
+            <pc:docMk/>
+            <pc:sldMasterMk cId="59772768" sldId="2147483662"/>
+            <pc:sldLayoutMk cId="602205465" sldId="2147483677"/>
+          </pc:sldLayoutMkLst>
+          <pc:spChg chg="add del">
+            <ac:chgData name="Bart van Mandje" userId="b6ba49fbd88bd4d1" providerId="LiveId" clId="{205A2D33-D804-44FB-A889-C809251970DC}" dt="2018-11-07T11:00:42.380" v="79"/>
+            <ac:spMkLst>
+              <pc:docMk/>
+              <pc:sldMasterMk cId="59772768" sldId="2147483662"/>
+              <pc:sldLayoutMk cId="602205465" sldId="2147483677"/>
+              <ac:spMk id="224" creationId="{00000000-0000-0000-0000-000000000000}"/>
+            </ac:spMkLst>
+          </pc:spChg>
+          <pc:spChg chg="add del">
+            <ac:chgData name="Bart van Mandje" userId="b6ba49fbd88bd4d1" providerId="LiveId" clId="{205A2D33-D804-44FB-A889-C809251970DC}" dt="2018-11-07T11:00:42.380" v="79"/>
+            <ac:spMkLst>
+              <pc:docMk/>
+              <pc:sldMasterMk cId="59772768" sldId="2147483662"/>
+              <pc:sldLayoutMk cId="602205465" sldId="2147483677"/>
+              <ac:spMk id="327" creationId="{00000000-0000-0000-0000-000000000000}"/>
+            </ac:spMkLst>
+          </pc:spChg>
+          <pc:grpChg chg="add del">
+            <ac:chgData name="Bart van Mandje" userId="b6ba49fbd88bd4d1" providerId="LiveId" clId="{205A2D33-D804-44FB-A889-C809251970DC}" dt="2018-11-07T11:00:42.380" v="79"/>
+            <ac:grpSpMkLst>
+              <pc:docMk/>
+              <pc:sldMasterMk cId="59772768" sldId="2147483662"/>
+              <pc:sldLayoutMk cId="602205465" sldId="2147483677"/>
+              <ac:grpSpMk id="226" creationId="{00000000-0000-0000-0000-000000000000}"/>
+            </ac:grpSpMkLst>
+          </pc:grpChg>
+          <pc:grpChg chg="add del">
+            <ac:chgData name="Bart van Mandje" userId="b6ba49fbd88bd4d1" providerId="LiveId" clId="{205A2D33-D804-44FB-A889-C809251970DC}" dt="2018-11-07T11:00:42.380" v="79"/>
+            <ac:grpSpMkLst>
+              <pc:docMk/>
+              <pc:sldMasterMk cId="59772768" sldId="2147483662"/>
+              <pc:sldLayoutMk cId="602205465" sldId="2147483677"/>
+              <ac:grpSpMk id="260" creationId="{00000000-0000-0000-0000-000000000000}"/>
+            </ac:grpSpMkLst>
+          </pc:grpChg>
+        </pc:sldLayoutChg>
+        <pc:sldLayoutChg chg="addSp delSp">
+          <pc:chgData name="Bart van Mandje" userId="b6ba49fbd88bd4d1" providerId="LiveId" clId="{205A2D33-D804-44FB-A889-C809251970DC}" dt="2018-11-07T11:00:42.380" v="79"/>
+          <pc:sldLayoutMkLst>
+            <pc:docMk/>
+            <pc:sldMasterMk cId="59772768" sldId="2147483662"/>
+            <pc:sldLayoutMk cId="881399895" sldId="2147483678"/>
+          </pc:sldLayoutMkLst>
+          <pc:spChg chg="add del">
+            <ac:chgData name="Bart van Mandje" userId="b6ba49fbd88bd4d1" providerId="LiveId" clId="{205A2D33-D804-44FB-A889-C809251970DC}" dt="2018-11-07T11:00:42.380" v="79"/>
+            <ac:spMkLst>
+              <pc:docMk/>
+              <pc:sldMasterMk cId="59772768" sldId="2147483662"/>
+              <pc:sldLayoutMk cId="881399895" sldId="2147483678"/>
+              <ac:spMk id="771" creationId="{00000000-0000-0000-0000-000000000000}"/>
+            </ac:spMkLst>
+          </pc:spChg>
+          <pc:grpChg chg="add del">
+            <ac:chgData name="Bart van Mandje" userId="b6ba49fbd88bd4d1" providerId="LiveId" clId="{205A2D33-D804-44FB-A889-C809251970DC}" dt="2018-11-07T11:00:42.380" v="79"/>
+            <ac:grpSpMkLst>
+              <pc:docMk/>
+              <pc:sldMasterMk cId="59772768" sldId="2147483662"/>
+              <pc:sldLayoutMk cId="881399895" sldId="2147483678"/>
+              <ac:grpSpMk id="670" creationId="{00000000-0000-0000-0000-000000000000}"/>
+            </ac:grpSpMkLst>
+          </pc:grpChg>
+          <pc:grpChg chg="add del">
+            <ac:chgData name="Bart van Mandje" userId="b6ba49fbd88bd4d1" providerId="LiveId" clId="{205A2D33-D804-44FB-A889-C809251970DC}" dt="2018-11-07T11:00:42.380" v="79"/>
+            <ac:grpSpMkLst>
+              <pc:docMk/>
+              <pc:sldMasterMk cId="59772768" sldId="2147483662"/>
+              <pc:sldLayoutMk cId="881399895" sldId="2147483678"/>
+              <ac:grpSpMk id="704" creationId="{00000000-0000-0000-0000-000000000000}"/>
+            </ac:grpSpMkLst>
+          </pc:grpChg>
+        </pc:sldLayoutChg>
+        <pc:sldLayoutChg chg="addSp delSp">
+          <pc:chgData name="Bart van Mandje" userId="b6ba49fbd88bd4d1" providerId="LiveId" clId="{205A2D33-D804-44FB-A889-C809251970DC}" dt="2018-11-07T11:00:42.380" v="79"/>
+          <pc:sldLayoutMkLst>
+            <pc:docMk/>
+            <pc:sldMasterMk cId="59772768" sldId="2147483662"/>
+            <pc:sldLayoutMk cId="1270111702" sldId="2147483679"/>
+          </pc:sldLayoutMkLst>
+          <pc:spChg chg="add del">
+            <ac:chgData name="Bart van Mandje" userId="b6ba49fbd88bd4d1" providerId="LiveId" clId="{205A2D33-D804-44FB-A889-C809251970DC}" dt="2018-11-07T11:00:42.380" v="79"/>
+            <ac:spMkLst>
+              <pc:docMk/>
+              <pc:sldMasterMk cId="59772768" sldId="2147483662"/>
+              <pc:sldLayoutMk cId="1270111702" sldId="2147483679"/>
+              <ac:spMk id="219" creationId="{00000000-0000-0000-0000-000000000000}"/>
+            </ac:spMkLst>
+          </pc:spChg>
+          <pc:spChg chg="add del">
+            <ac:chgData name="Bart van Mandje" userId="b6ba49fbd88bd4d1" providerId="LiveId" clId="{205A2D33-D804-44FB-A889-C809251970DC}" dt="2018-11-07T11:00:42.380" v="79"/>
+            <ac:spMkLst>
+              <pc:docMk/>
+              <pc:sldMasterMk cId="59772768" sldId="2147483662"/>
+              <pc:sldLayoutMk cId="1270111702" sldId="2147483679"/>
+              <ac:spMk id="222" creationId="{00000000-0000-0000-0000-000000000000}"/>
+            </ac:spMkLst>
+          </pc:spChg>
+        </pc:sldLayoutChg>
+        <pc:sldLayoutChg chg="addSp delSp">
+          <pc:chgData name="Bart van Mandje" userId="b6ba49fbd88bd4d1" providerId="LiveId" clId="{205A2D33-D804-44FB-A889-C809251970DC}" dt="2018-11-07T11:00:42.380" v="79"/>
+          <pc:sldLayoutMkLst>
+            <pc:docMk/>
+            <pc:sldMasterMk cId="59772768" sldId="2147483662"/>
+            <pc:sldLayoutMk cId="2406842004" sldId="2147483680"/>
+          </pc:sldLayoutMkLst>
+          <pc:spChg chg="add del">
+            <ac:chgData name="Bart van Mandje" userId="b6ba49fbd88bd4d1" providerId="LiveId" clId="{205A2D33-D804-44FB-A889-C809251970DC}" dt="2018-11-07T11:00:42.380" v="79"/>
+            <ac:spMkLst>
+              <pc:docMk/>
+              <pc:sldMasterMk cId="59772768" sldId="2147483662"/>
+              <pc:sldLayoutMk cId="2406842004" sldId="2147483680"/>
+              <ac:spMk id="659" creationId="{00000000-0000-0000-0000-000000000000}"/>
+            </ac:spMkLst>
+          </pc:spChg>
+        </pc:sldLayoutChg>
+        <pc:sldLayoutChg chg="addSp delSp">
+          <pc:chgData name="Bart van Mandje" userId="b6ba49fbd88bd4d1" providerId="LiveId" clId="{205A2D33-D804-44FB-A889-C809251970DC}" dt="2018-11-07T11:00:42.380" v="79"/>
+          <pc:sldLayoutMkLst>
+            <pc:docMk/>
+            <pc:sldMasterMk cId="59772768" sldId="2147483662"/>
+            <pc:sldLayoutMk cId="774104806" sldId="2147483681"/>
+          </pc:sldLayoutMkLst>
+          <pc:spChg chg="add del">
+            <ac:chgData name="Bart van Mandje" userId="b6ba49fbd88bd4d1" providerId="LiveId" clId="{205A2D33-D804-44FB-A889-C809251970DC}" dt="2018-11-07T11:00:42.380" v="79"/>
+            <ac:spMkLst>
+              <pc:docMk/>
+              <pc:sldMasterMk cId="59772768" sldId="2147483662"/>
+              <pc:sldLayoutMk cId="774104806" sldId="2147483681"/>
+              <ac:spMk id="773" creationId="{00000000-0000-0000-0000-000000000000}"/>
+            </ac:spMkLst>
+          </pc:spChg>
+        </pc:sldLayoutChg>
+      </pc:sldMasterChg>
     </pc:docChg>
   </pc:docChgLst>
 </pc:chgInfo>
@@ -1630,6 +2165,115 @@
     <p:extLst>
       <p:ext uri="{BB962C8B-B14F-4D97-AF65-F5344CB8AC3E}">
         <p14:creationId xmlns:p14="http://schemas.microsoft.com/office/powerpoint/2010/main" val="1744740853"/>
+      </p:ext>
+    </p:extLst>
+  </p:cSld>
+  <p:clrMapOvr>
+    <a:masterClrMapping/>
+  </p:clrMapOvr>
+</p:notes>
+</file>
+
+<file path=ppt/notesSlides/notesSlide17.xml><?xml version="1.0" encoding="utf-8"?>
+<p:notes xmlns:a="http://schemas.openxmlformats.org/drawingml/2006/main" xmlns:r="http://schemas.openxmlformats.org/officeDocument/2006/relationships" xmlns:p="http://schemas.openxmlformats.org/presentationml/2006/main" showMasterSp="0" showMasterPhAnim="0">
+  <p:cSld>
+    <p:spTree>
+      <p:nvGrpSpPr>
+        <p:cNvPr id="1" name="Shape 817"/>
+        <p:cNvGrpSpPr/>
+        <p:nvPr/>
+      </p:nvGrpSpPr>
+      <p:grpSpPr>
+        <a:xfrm>
+          <a:off x="0" y="0"/>
+          <a:ext cx="0" cy="0"/>
+          <a:chOff x="0" y="0"/>
+          <a:chExt cx="0" cy="0"/>
+        </a:xfrm>
+      </p:grpSpPr>
+      <p:sp>
+        <p:nvSpPr>
+          <p:cNvPr id="818" name="Google Shape;818;g35ed75ccf_015:notes"/>
+          <p:cNvSpPr>
+            <a:spLocks noGrp="1" noRot="1" noChangeAspect="1"/>
+          </p:cNvSpPr>
+          <p:nvPr>
+            <p:ph type="sldImg" idx="2"/>
+          </p:nvPr>
+        </p:nvSpPr>
+        <p:spPr>
+          <a:xfrm>
+            <a:off x="381000" y="685800"/>
+            <a:ext cx="6096000" cy="3429000"/>
+          </a:xfrm>
+          <a:custGeom>
+            <a:avLst/>
+            <a:gdLst/>
+            <a:ahLst/>
+            <a:cxnLst/>
+            <a:rect l="l" t="t" r="r" b="b"/>
+            <a:pathLst>
+              <a:path w="120000" h="120000" extrusionOk="0">
+                <a:moveTo>
+                  <a:pt x="0" y="0"/>
+                </a:moveTo>
+                <a:lnTo>
+                  <a:pt x="120000" y="0"/>
+                </a:lnTo>
+                <a:lnTo>
+                  <a:pt x="120000" y="120000"/>
+                </a:lnTo>
+                <a:lnTo>
+                  <a:pt x="0" y="120000"/>
+                </a:lnTo>
+                <a:close/>
+              </a:path>
+            </a:pathLst>
+          </a:custGeom>
+        </p:spPr>
+      </p:sp>
+      <p:sp>
+        <p:nvSpPr>
+          <p:cNvPr id="819" name="Google Shape;819;g35ed75ccf_015:notes"/>
+          <p:cNvSpPr txBox="1">
+            <a:spLocks noGrp="1"/>
+          </p:cNvSpPr>
+          <p:nvPr>
+            <p:ph type="body" idx="1"/>
+          </p:nvPr>
+        </p:nvSpPr>
+        <p:spPr>
+          <a:xfrm>
+            <a:off x="685800" y="4343400"/>
+            <a:ext cx="5486400" cy="4114800"/>
+          </a:xfrm>
+          <a:prstGeom prst="rect">
+            <a:avLst/>
+          </a:prstGeom>
+        </p:spPr>
+        <p:txBody>
+          <a:bodyPr spcFirstLastPara="1" wrap="square" lIns="91425" tIns="91425" rIns="91425" bIns="91425" anchor="t" anchorCtr="0">
+            <a:noAutofit/>
+          </a:bodyPr>
+          <a:lstStyle/>
+          <a:p>
+            <a:pPr marL="0" lvl="0" indent="0" algn="l" rtl="0">
+              <a:spcBef>
+                <a:spcPts val="0"/>
+              </a:spcBef>
+              <a:spcAft>
+                <a:spcPts val="0"/>
+              </a:spcAft>
+              <a:buNone/>
+            </a:pPr>
+            <a:endParaRPr/>
+          </a:p>
+        </p:txBody>
+      </p:sp>
+    </p:spTree>
+    <p:extLst>
+      <p:ext uri="{BB962C8B-B14F-4D97-AF65-F5344CB8AC3E}">
+        <p14:creationId xmlns:p14="http://schemas.microsoft.com/office/powerpoint/2010/main" val="3167972748"/>
       </p:ext>
     </p:extLst>
   </p:cSld>
@@ -17859,7 +18503,7 @@
             </a:pPr>
             <a:fld id="{00000000-1234-1234-1234-123412341234}" type="slidenum">
               <a:rPr lang="en"/>
-              <a:t>‹#›</a:t>
+              <a:t>‹nr.›</a:t>
             </a:fld>
             <a:endParaRPr/>
           </a:p>
@@ -19888,7 +20532,7 @@
             </a:pPr>
             <a:fld id="{00000000-1234-1234-1234-123412341234}" type="slidenum">
               <a:rPr lang="en"/>
-              <a:t>‹#›</a:t>
+              <a:t>‹nr.›</a:t>
             </a:fld>
             <a:endParaRPr/>
           </a:p>
@@ -28537,7 +29181,7 @@
             </a:pPr>
             <a:fld id="{00000000-1234-1234-1234-123412341234}" type="slidenum">
               <a:rPr lang="en"/>
-              <a:t>‹#›</a:t>
+              <a:t>‹nr.›</a:t>
             </a:fld>
             <a:endParaRPr/>
           </a:p>
@@ -29163,7 +29807,7 @@
             </a:pPr>
             <a:fld id="{00000000-1234-1234-1234-123412341234}" type="slidenum">
               <a:rPr lang="en"/>
-              <a:t>‹#›</a:t>
+              <a:t>‹nr.›</a:t>
             </a:fld>
             <a:endParaRPr/>
           </a:p>
@@ -29267,7 +29911,7 @@
             </a:pPr>
             <a:fld id="{00000000-1234-1234-1234-123412341234}" type="slidenum">
               <a:rPr lang="en"/>
-              <a:t>‹#›</a:t>
+              <a:t>‹nr.›</a:t>
             </a:fld>
             <a:endParaRPr/>
           </a:p>
@@ -29371,7 +30015,7 @@
             </a:pPr>
             <a:fld id="{00000000-1234-1234-1234-123412341234}" type="slidenum">
               <a:rPr lang="en"/>
-              <a:t>‹#›</a:t>
+              <a:t>‹nr.›</a:t>
             </a:fld>
             <a:endParaRPr/>
           </a:p>
@@ -37669,7 +38313,7 @@
             </a:pPr>
             <a:fld id="{00000000-1234-1234-1234-123412341234}" type="slidenum">
               <a:rPr lang="en"/>
-              <a:t>‹#›</a:t>
+              <a:t>‹nr.›</a:t>
             </a:fld>
             <a:endParaRPr/>
           </a:p>
@@ -46425,7 +47069,7 @@
             </a:pPr>
             <a:fld id="{00000000-1234-1234-1234-123412341234}" type="slidenum">
               <a:rPr lang="en"/>
-              <a:t>‹#›</a:t>
+              <a:t>‹nr.›</a:t>
             </a:fld>
             <a:endParaRPr/>
           </a:p>
@@ -46445,9 +47089,6 @@
     <p:sldLayoutId id="2147483659" r:id="rId8"/>
     <p:sldLayoutId id="2147483660" r:id="rId9"/>
   </p:sldLayoutIdLst>
-  <p:transition>
-    <p:fade thruBlk="1"/>
-  </p:transition>
   <p:hf hdr="0" ftr="0" dt="0"/>
   <p:txStyles>
     <p:titleStyle>
@@ -54531,6 +55172,78 @@
 </p:sld>
 </file>
 
+<file path=ppt/slides/slide18.xml><?xml version="1.0" encoding="utf-8"?>
+<p:sld xmlns:a="http://schemas.openxmlformats.org/drawingml/2006/main" xmlns:r="http://schemas.openxmlformats.org/officeDocument/2006/relationships" xmlns:p="http://schemas.openxmlformats.org/presentationml/2006/main">
+  <p:cSld>
+    <p:spTree>
+      <p:nvGrpSpPr>
+        <p:cNvPr id="1" name="Shape 820"/>
+        <p:cNvGrpSpPr/>
+        <p:nvPr/>
+      </p:nvGrpSpPr>
+      <p:grpSpPr>
+        <a:xfrm>
+          <a:off x="0" y="0"/>
+          <a:ext cx="0" cy="0"/>
+          <a:chOff x="0" y="0"/>
+          <a:chExt cx="0" cy="0"/>
+        </a:xfrm>
+      </p:grpSpPr>
+      <p:sp>
+        <p:nvSpPr>
+          <p:cNvPr id="835" name="Google Shape;835;p21"/>
+          <p:cNvSpPr txBox="1">
+            <a:spLocks noGrp="1"/>
+          </p:cNvSpPr>
+          <p:nvPr>
+            <p:ph type="sldNum" idx="12"/>
+          </p:nvPr>
+        </p:nvSpPr>
+        <p:spPr>
+          <a:xfrm>
+            <a:off x="8586575" y="-11875"/>
+            <a:ext cx="557400" cy="547800"/>
+          </a:xfrm>
+          <a:prstGeom prst="rect">
+            <a:avLst/>
+          </a:prstGeom>
+        </p:spPr>
+        <p:txBody>
+          <a:bodyPr spcFirstLastPara="1" wrap="square" lIns="91425" tIns="91425" rIns="91425" bIns="91425" anchor="ctr" anchorCtr="0">
+            <a:noAutofit/>
+          </a:bodyPr>
+          <a:lstStyle/>
+          <a:p>
+            <a:pPr marL="0" lvl="0" indent="0" algn="ctr" rtl="0">
+              <a:spcBef>
+                <a:spcPts val="0"/>
+              </a:spcBef>
+              <a:spcAft>
+                <a:spcPts val="0"/>
+              </a:spcAft>
+              <a:buNone/>
+            </a:pPr>
+            <a:fld id="{00000000-1234-1234-1234-123412341234}" type="slidenum">
+              <a:rPr lang="en"/>
+              <a:t>18</a:t>
+            </a:fld>
+            <a:endParaRPr/>
+          </a:p>
+        </p:txBody>
+      </p:sp>
+    </p:spTree>
+    <p:extLst>
+      <p:ext uri="{BB962C8B-B14F-4D97-AF65-F5344CB8AC3E}">
+        <p14:creationId xmlns:p14="http://schemas.microsoft.com/office/powerpoint/2010/main" val="304383295"/>
+      </p:ext>
+    </p:extLst>
+  </p:cSld>
+  <p:clrMapOvr>
+    <a:masterClrMapping/>
+  </p:clrMapOvr>
+</p:sld>
+</file>
+
 <file path=ppt/slides/slide2.xml><?xml version="1.0" encoding="utf-8"?>
 <p:sld xmlns:a="http://schemas.openxmlformats.org/drawingml/2006/main" xmlns:r="http://schemas.openxmlformats.org/officeDocument/2006/relationships" xmlns:p="http://schemas.openxmlformats.org/presentationml/2006/main">
   <p:cSld>
@@ -54616,24 +55329,7 @@
           <a:lstStyle/>
           <a:p>
             <a:pPr marL="342900" indent="-342900"/>
-            <a:r>
-              <a:rPr lang="nl-NL" b="1" dirty="0"/>
-              <a:t>Denkproces</a:t>
-            </a:r>
-          </a:p>
-          <a:p>
-            <a:pPr marL="800100" lvl="1" indent="-342900"/>
-            <a:r>
-              <a:rPr lang="nl-NL" b="1" dirty="0"/>
-              <a:t>Welzijn</a:t>
-            </a:r>
-          </a:p>
-          <a:p>
-            <a:pPr marL="800100" lvl="1" indent="-342900"/>
-            <a:r>
-              <a:rPr lang="nl-NL" b="1" dirty="0"/>
-              <a:t>Kernvraag</a:t>
-            </a:r>
+            <a:endParaRPr lang="nl-NL" b="1" dirty="0"/>
           </a:p>
           <a:p>
             <a:pPr marL="342900" indent="-342900"/>

</xml_diff>